<commit_message>
One more example with bitwise shift
</commit_message>
<xml_diff>
--- a/2024-2025/slides_pptx/4_bitwise_operations.pptx
+++ b/2024-2025/slides_pptx/4_bitwise_operations.pptx
@@ -5,7 +5,7 @@
     <p:sldMasterId id="2147483660" r:id="rId1"/>
   </p:sldMasterIdLst>
   <p:notesMasterIdLst>
-    <p:notesMasterId r:id="rId16"/>
+    <p:notesMasterId r:id="rId20"/>
   </p:notesMasterIdLst>
   <p:sldIdLst>
     <p:sldId id="256" r:id="rId2"/>
@@ -16,12 +16,16 @@
     <p:sldId id="273" r:id="rId7"/>
     <p:sldId id="274" r:id="rId8"/>
     <p:sldId id="275" r:id="rId9"/>
-    <p:sldId id="276" r:id="rId10"/>
-    <p:sldId id="261" r:id="rId11"/>
-    <p:sldId id="277" r:id="rId12"/>
-    <p:sldId id="279" r:id="rId13"/>
-    <p:sldId id="278" r:id="rId14"/>
-    <p:sldId id="290" r:id="rId15"/>
+    <p:sldId id="291" r:id="rId10"/>
+    <p:sldId id="276" r:id="rId11"/>
+    <p:sldId id="294" r:id="rId12"/>
+    <p:sldId id="295" r:id="rId13"/>
+    <p:sldId id="292" r:id="rId14"/>
+    <p:sldId id="261" r:id="rId15"/>
+    <p:sldId id="277" r:id="rId16"/>
+    <p:sldId id="279" r:id="rId17"/>
+    <p:sldId id="278" r:id="rId18"/>
+    <p:sldId id="290" r:id="rId19"/>
   </p:sldIdLst>
   <p:sldSz cx="12192000" cy="6858000"/>
   <p:notesSz cx="6858000" cy="9144000"/>
@@ -647,7 +651,7 @@
     </p:spTree>
     <p:extLst>
       <p:ext uri="{BB962C8B-B14F-4D97-AF65-F5344CB8AC3E}">
-        <p14:creationId xmlns:p14="http://schemas.microsoft.com/office/powerpoint/2010/main" val="1881331595"/>
+        <p14:creationId xmlns:p14="http://schemas.microsoft.com/office/powerpoint/2010/main" val="68216777"/>
       </p:ext>
     </p:extLst>
   </p:cSld>
@@ -731,7 +735,7 @@
     </p:spTree>
     <p:extLst>
       <p:ext uri="{BB962C8B-B14F-4D97-AF65-F5344CB8AC3E}">
-        <p14:creationId xmlns:p14="http://schemas.microsoft.com/office/powerpoint/2010/main" val="2352111375"/>
+        <p14:creationId xmlns:p14="http://schemas.microsoft.com/office/powerpoint/2010/main" val="3885794675"/>
       </p:ext>
     </p:extLst>
   </p:cSld>
@@ -815,7 +819,7 @@
     </p:spTree>
     <p:extLst>
       <p:ext uri="{BB962C8B-B14F-4D97-AF65-F5344CB8AC3E}">
-        <p14:creationId xmlns:p14="http://schemas.microsoft.com/office/powerpoint/2010/main" val="589014236"/>
+        <p14:creationId xmlns:p14="http://schemas.microsoft.com/office/powerpoint/2010/main" val="164156266"/>
       </p:ext>
     </p:extLst>
   </p:cSld>
@@ -899,7 +903,7 @@
     </p:spTree>
     <p:extLst>
       <p:ext uri="{BB962C8B-B14F-4D97-AF65-F5344CB8AC3E}">
-        <p14:creationId xmlns:p14="http://schemas.microsoft.com/office/powerpoint/2010/main" val="2750055071"/>
+        <p14:creationId xmlns:p14="http://schemas.microsoft.com/office/powerpoint/2010/main" val="282522472"/>
       </p:ext>
     </p:extLst>
   </p:cSld>
@@ -975,6 +979,342 @@
             <a:fld id="{207EAB29-8E86-49C7-96F5-7C9D72076108}" type="slidenum">
               <a:rPr lang="ru-RU" smtClean="0"/>
               <a:t>14</a:t>
+            </a:fld>
+            <a:endParaRPr lang="ru-RU"/>
+          </a:p>
+        </p:txBody>
+      </p:sp>
+    </p:spTree>
+    <p:extLst>
+      <p:ext uri="{BB962C8B-B14F-4D97-AF65-F5344CB8AC3E}">
+        <p14:creationId xmlns:p14="http://schemas.microsoft.com/office/powerpoint/2010/main" val="1881331595"/>
+      </p:ext>
+    </p:extLst>
+  </p:cSld>
+  <p:clrMapOvr>
+    <a:masterClrMapping/>
+  </p:clrMapOvr>
+</p:notes>
+</file>
+
+<file path=ppt/notesSlides/notesSlide15.xml><?xml version="1.0" encoding="utf-8"?>
+<p:notes xmlns:a="http://schemas.openxmlformats.org/drawingml/2006/main" xmlns:r="http://schemas.openxmlformats.org/officeDocument/2006/relationships" xmlns:p="http://schemas.openxmlformats.org/presentationml/2006/main">
+  <p:cSld>
+    <p:spTree>
+      <p:nvGrpSpPr>
+        <p:cNvPr id="1" name=""/>
+        <p:cNvGrpSpPr/>
+        <p:nvPr/>
+      </p:nvGrpSpPr>
+      <p:grpSpPr>
+        <a:xfrm>
+          <a:off x="0" y="0"/>
+          <a:ext cx="0" cy="0"/>
+          <a:chOff x="0" y="0"/>
+          <a:chExt cx="0" cy="0"/>
+        </a:xfrm>
+      </p:grpSpPr>
+      <p:sp>
+        <p:nvSpPr>
+          <p:cNvPr id="2" name="Образ слайда 1"/>
+          <p:cNvSpPr>
+            <a:spLocks noGrp="1" noRot="1" noChangeAspect="1"/>
+          </p:cNvSpPr>
+          <p:nvPr>
+            <p:ph type="sldImg"/>
+          </p:nvPr>
+        </p:nvSpPr>
+        <p:spPr/>
+      </p:sp>
+      <p:sp>
+        <p:nvSpPr>
+          <p:cNvPr id="3" name="Заметки 2"/>
+          <p:cNvSpPr>
+            <a:spLocks noGrp="1"/>
+          </p:cNvSpPr>
+          <p:nvPr>
+            <p:ph type="body" idx="1"/>
+          </p:nvPr>
+        </p:nvSpPr>
+        <p:spPr/>
+        <p:txBody>
+          <a:bodyPr/>
+          <a:lstStyle/>
+          <a:p>
+            <a:endParaRPr lang="ru-RU" dirty="0"/>
+          </a:p>
+        </p:txBody>
+      </p:sp>
+      <p:sp>
+        <p:nvSpPr>
+          <p:cNvPr id="4" name="Номер слайда 3"/>
+          <p:cNvSpPr>
+            <a:spLocks noGrp="1"/>
+          </p:cNvSpPr>
+          <p:nvPr>
+            <p:ph type="sldNum" sz="quarter" idx="10"/>
+          </p:nvPr>
+        </p:nvSpPr>
+        <p:spPr/>
+        <p:txBody>
+          <a:bodyPr/>
+          <a:lstStyle/>
+          <a:p>
+            <a:fld id="{207EAB29-8E86-49C7-96F5-7C9D72076108}" type="slidenum">
+              <a:rPr lang="ru-RU" smtClean="0"/>
+              <a:t>15</a:t>
+            </a:fld>
+            <a:endParaRPr lang="ru-RU"/>
+          </a:p>
+        </p:txBody>
+      </p:sp>
+    </p:spTree>
+    <p:extLst>
+      <p:ext uri="{BB962C8B-B14F-4D97-AF65-F5344CB8AC3E}">
+        <p14:creationId xmlns:p14="http://schemas.microsoft.com/office/powerpoint/2010/main" val="2352111375"/>
+      </p:ext>
+    </p:extLst>
+  </p:cSld>
+  <p:clrMapOvr>
+    <a:masterClrMapping/>
+  </p:clrMapOvr>
+</p:notes>
+</file>
+
+<file path=ppt/notesSlides/notesSlide16.xml><?xml version="1.0" encoding="utf-8"?>
+<p:notes xmlns:a="http://schemas.openxmlformats.org/drawingml/2006/main" xmlns:r="http://schemas.openxmlformats.org/officeDocument/2006/relationships" xmlns:p="http://schemas.openxmlformats.org/presentationml/2006/main">
+  <p:cSld>
+    <p:spTree>
+      <p:nvGrpSpPr>
+        <p:cNvPr id="1" name=""/>
+        <p:cNvGrpSpPr/>
+        <p:nvPr/>
+      </p:nvGrpSpPr>
+      <p:grpSpPr>
+        <a:xfrm>
+          <a:off x="0" y="0"/>
+          <a:ext cx="0" cy="0"/>
+          <a:chOff x="0" y="0"/>
+          <a:chExt cx="0" cy="0"/>
+        </a:xfrm>
+      </p:grpSpPr>
+      <p:sp>
+        <p:nvSpPr>
+          <p:cNvPr id="2" name="Образ слайда 1"/>
+          <p:cNvSpPr>
+            <a:spLocks noGrp="1" noRot="1" noChangeAspect="1"/>
+          </p:cNvSpPr>
+          <p:nvPr>
+            <p:ph type="sldImg"/>
+          </p:nvPr>
+        </p:nvSpPr>
+        <p:spPr/>
+      </p:sp>
+      <p:sp>
+        <p:nvSpPr>
+          <p:cNvPr id="3" name="Заметки 2"/>
+          <p:cNvSpPr>
+            <a:spLocks noGrp="1"/>
+          </p:cNvSpPr>
+          <p:nvPr>
+            <p:ph type="body" idx="1"/>
+          </p:nvPr>
+        </p:nvSpPr>
+        <p:spPr/>
+        <p:txBody>
+          <a:bodyPr/>
+          <a:lstStyle/>
+          <a:p>
+            <a:endParaRPr lang="ru-RU" dirty="0"/>
+          </a:p>
+        </p:txBody>
+      </p:sp>
+      <p:sp>
+        <p:nvSpPr>
+          <p:cNvPr id="4" name="Номер слайда 3"/>
+          <p:cNvSpPr>
+            <a:spLocks noGrp="1"/>
+          </p:cNvSpPr>
+          <p:nvPr>
+            <p:ph type="sldNum" sz="quarter" idx="10"/>
+          </p:nvPr>
+        </p:nvSpPr>
+        <p:spPr/>
+        <p:txBody>
+          <a:bodyPr/>
+          <a:lstStyle/>
+          <a:p>
+            <a:fld id="{207EAB29-8E86-49C7-96F5-7C9D72076108}" type="slidenum">
+              <a:rPr lang="ru-RU" smtClean="0"/>
+              <a:t>16</a:t>
+            </a:fld>
+            <a:endParaRPr lang="ru-RU"/>
+          </a:p>
+        </p:txBody>
+      </p:sp>
+    </p:spTree>
+    <p:extLst>
+      <p:ext uri="{BB962C8B-B14F-4D97-AF65-F5344CB8AC3E}">
+        <p14:creationId xmlns:p14="http://schemas.microsoft.com/office/powerpoint/2010/main" val="589014236"/>
+      </p:ext>
+    </p:extLst>
+  </p:cSld>
+  <p:clrMapOvr>
+    <a:masterClrMapping/>
+  </p:clrMapOvr>
+</p:notes>
+</file>
+
+<file path=ppt/notesSlides/notesSlide17.xml><?xml version="1.0" encoding="utf-8"?>
+<p:notes xmlns:a="http://schemas.openxmlformats.org/drawingml/2006/main" xmlns:r="http://schemas.openxmlformats.org/officeDocument/2006/relationships" xmlns:p="http://schemas.openxmlformats.org/presentationml/2006/main">
+  <p:cSld>
+    <p:spTree>
+      <p:nvGrpSpPr>
+        <p:cNvPr id="1" name=""/>
+        <p:cNvGrpSpPr/>
+        <p:nvPr/>
+      </p:nvGrpSpPr>
+      <p:grpSpPr>
+        <a:xfrm>
+          <a:off x="0" y="0"/>
+          <a:ext cx="0" cy="0"/>
+          <a:chOff x="0" y="0"/>
+          <a:chExt cx="0" cy="0"/>
+        </a:xfrm>
+      </p:grpSpPr>
+      <p:sp>
+        <p:nvSpPr>
+          <p:cNvPr id="2" name="Образ слайда 1"/>
+          <p:cNvSpPr>
+            <a:spLocks noGrp="1" noRot="1" noChangeAspect="1"/>
+          </p:cNvSpPr>
+          <p:nvPr>
+            <p:ph type="sldImg"/>
+          </p:nvPr>
+        </p:nvSpPr>
+        <p:spPr/>
+      </p:sp>
+      <p:sp>
+        <p:nvSpPr>
+          <p:cNvPr id="3" name="Заметки 2"/>
+          <p:cNvSpPr>
+            <a:spLocks noGrp="1"/>
+          </p:cNvSpPr>
+          <p:nvPr>
+            <p:ph type="body" idx="1"/>
+          </p:nvPr>
+        </p:nvSpPr>
+        <p:spPr/>
+        <p:txBody>
+          <a:bodyPr/>
+          <a:lstStyle/>
+          <a:p>
+            <a:endParaRPr lang="ru-RU" dirty="0"/>
+          </a:p>
+        </p:txBody>
+      </p:sp>
+      <p:sp>
+        <p:nvSpPr>
+          <p:cNvPr id="4" name="Номер слайда 3"/>
+          <p:cNvSpPr>
+            <a:spLocks noGrp="1"/>
+          </p:cNvSpPr>
+          <p:nvPr>
+            <p:ph type="sldNum" sz="quarter" idx="10"/>
+          </p:nvPr>
+        </p:nvSpPr>
+        <p:spPr/>
+        <p:txBody>
+          <a:bodyPr/>
+          <a:lstStyle/>
+          <a:p>
+            <a:fld id="{207EAB29-8E86-49C7-96F5-7C9D72076108}" type="slidenum">
+              <a:rPr lang="ru-RU" smtClean="0"/>
+              <a:t>17</a:t>
+            </a:fld>
+            <a:endParaRPr lang="ru-RU"/>
+          </a:p>
+        </p:txBody>
+      </p:sp>
+    </p:spTree>
+    <p:extLst>
+      <p:ext uri="{BB962C8B-B14F-4D97-AF65-F5344CB8AC3E}">
+        <p14:creationId xmlns:p14="http://schemas.microsoft.com/office/powerpoint/2010/main" val="2750055071"/>
+      </p:ext>
+    </p:extLst>
+  </p:cSld>
+  <p:clrMapOvr>
+    <a:masterClrMapping/>
+  </p:clrMapOvr>
+</p:notes>
+</file>
+
+<file path=ppt/notesSlides/notesSlide18.xml><?xml version="1.0" encoding="utf-8"?>
+<p:notes xmlns:a="http://schemas.openxmlformats.org/drawingml/2006/main" xmlns:r="http://schemas.openxmlformats.org/officeDocument/2006/relationships" xmlns:p="http://schemas.openxmlformats.org/presentationml/2006/main">
+  <p:cSld>
+    <p:spTree>
+      <p:nvGrpSpPr>
+        <p:cNvPr id="1" name=""/>
+        <p:cNvGrpSpPr/>
+        <p:nvPr/>
+      </p:nvGrpSpPr>
+      <p:grpSpPr>
+        <a:xfrm>
+          <a:off x="0" y="0"/>
+          <a:ext cx="0" cy="0"/>
+          <a:chOff x="0" y="0"/>
+          <a:chExt cx="0" cy="0"/>
+        </a:xfrm>
+      </p:grpSpPr>
+      <p:sp>
+        <p:nvSpPr>
+          <p:cNvPr id="2" name="Образ слайда 1"/>
+          <p:cNvSpPr>
+            <a:spLocks noGrp="1" noRot="1" noChangeAspect="1"/>
+          </p:cNvSpPr>
+          <p:nvPr>
+            <p:ph type="sldImg"/>
+          </p:nvPr>
+        </p:nvSpPr>
+        <p:spPr/>
+      </p:sp>
+      <p:sp>
+        <p:nvSpPr>
+          <p:cNvPr id="3" name="Заметки 2"/>
+          <p:cNvSpPr>
+            <a:spLocks noGrp="1"/>
+          </p:cNvSpPr>
+          <p:nvPr>
+            <p:ph type="body" idx="1"/>
+          </p:nvPr>
+        </p:nvSpPr>
+        <p:spPr/>
+        <p:txBody>
+          <a:bodyPr/>
+          <a:lstStyle/>
+          <a:p>
+            <a:endParaRPr lang="ru-RU" dirty="0"/>
+          </a:p>
+        </p:txBody>
+      </p:sp>
+      <p:sp>
+        <p:nvSpPr>
+          <p:cNvPr id="4" name="Номер слайда 3"/>
+          <p:cNvSpPr>
+            <a:spLocks noGrp="1"/>
+          </p:cNvSpPr>
+          <p:nvPr>
+            <p:ph type="sldNum" sz="quarter" idx="10"/>
+          </p:nvPr>
+        </p:nvSpPr>
+        <p:spPr/>
+        <p:txBody>
+          <a:bodyPr/>
+          <a:lstStyle/>
+          <a:p>
+            <a:fld id="{207EAB29-8E86-49C7-96F5-7C9D72076108}" type="slidenum">
+              <a:rPr lang="ru-RU" smtClean="0"/>
+              <a:t>18</a:t>
             </a:fld>
             <a:endParaRPr lang="ru-RU"/>
           </a:p>
@@ -1655,7 +1995,7 @@
     </p:spTree>
     <p:extLst>
       <p:ext uri="{BB962C8B-B14F-4D97-AF65-F5344CB8AC3E}">
-        <p14:creationId xmlns:p14="http://schemas.microsoft.com/office/powerpoint/2010/main" val="68216777"/>
+        <p14:creationId xmlns:p14="http://schemas.microsoft.com/office/powerpoint/2010/main" val="2507027491"/>
       </p:ext>
     </p:extLst>
   </p:cSld>
@@ -4611,6 +4951,1524 @@
         </p:nvSpPr>
         <p:spPr>
           <a:xfrm>
+            <a:off x="1589314" y="497632"/>
+            <a:ext cx="9013371" cy="1164869"/>
+          </a:xfrm>
+          <a:prstGeom prst="rect">
+            <a:avLst/>
+          </a:prstGeom>
+        </p:spPr>
+        <p:txBody>
+          <a:bodyPr vert="horz" lIns="91440" tIns="45720" rIns="91440" bIns="45720" rtlCol="0" anchor="b">
+            <a:normAutofit/>
+          </a:bodyPr>
+          <a:lstStyle>
+            <a:lvl1pPr algn="ctr" defTabSz="914400" rtl="0" eaLnBrk="1" latinLnBrk="0" hangingPunct="1">
+              <a:lnSpc>
+                <a:spcPct val="90000"/>
+              </a:lnSpc>
+              <a:spcBef>
+                <a:spcPct val="0"/>
+              </a:spcBef>
+              <a:buNone/>
+              <a:defRPr sz="6000" kern="1200">
+                <a:solidFill>
+                  <a:schemeClr val="tx1"/>
+                </a:solidFill>
+                <a:latin typeface="+mj-lt"/>
+                <a:ea typeface="+mj-ea"/>
+                <a:cs typeface="+mj-cs"/>
+              </a:defRPr>
+            </a:lvl1pPr>
+          </a:lstStyle>
+          <a:p>
+            <a:r>
+              <a:rPr lang="en-US" dirty="0"/>
+              <a:t>Shift (</a:t>
+            </a:r>
+            <a:r>
+              <a:rPr lang="ru-RU" dirty="0"/>
+              <a:t>Сдвиг</a:t>
+            </a:r>
+            <a:r>
+              <a:rPr lang="en-US" dirty="0"/>
+              <a:t>) &gt;&gt;, &lt;&lt;</a:t>
+            </a:r>
+            <a:endParaRPr lang="ru-RU" dirty="0"/>
+          </a:p>
+        </p:txBody>
+      </p:sp>
+      <p:sp>
+        <p:nvSpPr>
+          <p:cNvPr id="9" name="TextBox 8">
+            <a:extLst>
+              <a:ext uri="{FF2B5EF4-FFF2-40B4-BE49-F238E27FC236}">
+                <a16:creationId xmlns:a16="http://schemas.microsoft.com/office/drawing/2014/main" id="{641297FF-3408-40A1-8775-E2802D306B64}"/>
+              </a:ext>
+            </a:extLst>
+          </p:cNvPr>
+          <p:cNvSpPr txBox="1"/>
+          <p:nvPr/>
+        </p:nvSpPr>
+        <p:spPr>
+          <a:xfrm>
+            <a:off x="2556220" y="1854606"/>
+            <a:ext cx="4229154" cy="1938992"/>
+          </a:xfrm>
+          <a:prstGeom prst="rect">
+            <a:avLst/>
+          </a:prstGeom>
+          <a:noFill/>
+        </p:spPr>
+        <p:txBody>
+          <a:bodyPr wrap="square">
+            <a:spAutoFit/>
+          </a:bodyPr>
+          <a:lstStyle/>
+          <a:p>
+            <a:r>
+              <a:rPr lang="en-US" sz="2400" dirty="0">
+                <a:latin typeface="Times New Roman" panose="02020603050405020304" pitchFamily="18" charset="0"/>
+                <a:cs typeface="Times New Roman" panose="02020603050405020304" pitchFamily="18" charset="0"/>
+              </a:rPr>
+              <a:t>char a = 5;</a:t>
+            </a:r>
+          </a:p>
+          <a:p>
+            <a:r>
+              <a:rPr lang="en-US" sz="2400" dirty="0">
+                <a:latin typeface="Times New Roman" panose="02020603050405020304" pitchFamily="18" charset="0"/>
+                <a:cs typeface="Times New Roman" panose="02020603050405020304" pitchFamily="18" charset="0"/>
+              </a:rPr>
+              <a:t>char c = a &gt;&gt; 1; // = 2</a:t>
+            </a:r>
+          </a:p>
+          <a:p>
+            <a:r>
+              <a:rPr lang="en-US" sz="2400" dirty="0">
+                <a:latin typeface="Times New Roman" panose="02020603050405020304" pitchFamily="18" charset="0"/>
+                <a:cs typeface="Times New Roman" panose="02020603050405020304" pitchFamily="18" charset="0"/>
+              </a:rPr>
+              <a:t>&gt;&gt; 00000101</a:t>
+            </a:r>
+          </a:p>
+          <a:p>
+            <a:r>
+              <a:rPr lang="en-US" sz="2400" dirty="0">
+                <a:latin typeface="Times New Roman" panose="02020603050405020304" pitchFamily="18" charset="0"/>
+                <a:cs typeface="Times New Roman" panose="02020603050405020304" pitchFamily="18" charset="0"/>
+              </a:rPr>
+              <a:t>      00000010</a:t>
+            </a:r>
+          </a:p>
+          <a:p>
+            <a:endParaRPr lang="en-US" sz="2400" dirty="0">
+              <a:latin typeface="Times New Roman" panose="02020603050405020304" pitchFamily="18" charset="0"/>
+              <a:cs typeface="Times New Roman" panose="02020603050405020304" pitchFamily="18" charset="0"/>
+            </a:endParaRPr>
+          </a:p>
+        </p:txBody>
+      </p:sp>
+      <p:sp>
+        <p:nvSpPr>
+          <p:cNvPr id="4" name="TextBox 3">
+            <a:extLst>
+              <a:ext uri="{FF2B5EF4-FFF2-40B4-BE49-F238E27FC236}">
+                <a16:creationId xmlns:a16="http://schemas.microsoft.com/office/drawing/2014/main" id="{B9D59634-A052-4F56-A795-8336D0FC0D11}"/>
+              </a:ext>
+            </a:extLst>
+          </p:cNvPr>
+          <p:cNvSpPr txBox="1"/>
+          <p:nvPr/>
+        </p:nvSpPr>
+        <p:spPr>
+          <a:xfrm>
+            <a:off x="2512076" y="3873296"/>
+            <a:ext cx="4229154" cy="1938992"/>
+          </a:xfrm>
+          <a:prstGeom prst="rect">
+            <a:avLst/>
+          </a:prstGeom>
+          <a:noFill/>
+        </p:spPr>
+        <p:txBody>
+          <a:bodyPr wrap="square">
+            <a:spAutoFit/>
+          </a:bodyPr>
+          <a:lstStyle/>
+          <a:p>
+            <a:r>
+              <a:rPr lang="en-US" sz="2400" dirty="0">
+                <a:latin typeface="Times New Roman" panose="02020603050405020304" pitchFamily="18" charset="0"/>
+                <a:cs typeface="Times New Roman" panose="02020603050405020304" pitchFamily="18" charset="0"/>
+              </a:rPr>
+              <a:t>char a = -5;</a:t>
+            </a:r>
+          </a:p>
+          <a:p>
+            <a:r>
+              <a:rPr lang="en-US" sz="2400" dirty="0">
+                <a:latin typeface="Times New Roman" panose="02020603050405020304" pitchFamily="18" charset="0"/>
+                <a:cs typeface="Times New Roman" panose="02020603050405020304" pitchFamily="18" charset="0"/>
+              </a:rPr>
+              <a:t>char c = a &gt;&gt; 1;// = -3;</a:t>
+            </a:r>
+          </a:p>
+          <a:p>
+            <a:r>
+              <a:rPr lang="en-US" sz="2400" dirty="0">
+                <a:latin typeface="Times New Roman" panose="02020603050405020304" pitchFamily="18" charset="0"/>
+                <a:cs typeface="Times New Roman" panose="02020603050405020304" pitchFamily="18" charset="0"/>
+              </a:rPr>
+              <a:t>&gt;&gt; 11111011</a:t>
+            </a:r>
+          </a:p>
+          <a:p>
+            <a:r>
+              <a:rPr lang="en-US" sz="2400" dirty="0">
+                <a:latin typeface="Times New Roman" panose="02020603050405020304" pitchFamily="18" charset="0"/>
+                <a:cs typeface="Times New Roman" panose="02020603050405020304" pitchFamily="18" charset="0"/>
+              </a:rPr>
+              <a:t>      11111101</a:t>
+            </a:r>
+          </a:p>
+          <a:p>
+            <a:endParaRPr lang="en-US" sz="2400" dirty="0">
+              <a:latin typeface="Times New Roman" panose="02020603050405020304" pitchFamily="18" charset="0"/>
+              <a:cs typeface="Times New Roman" panose="02020603050405020304" pitchFamily="18" charset="0"/>
+            </a:endParaRPr>
+          </a:p>
+        </p:txBody>
+      </p:sp>
+      <p:sp>
+        <p:nvSpPr>
+          <p:cNvPr id="6" name="TextBox 5">
+            <a:extLst>
+              <a:ext uri="{FF2B5EF4-FFF2-40B4-BE49-F238E27FC236}">
+                <a16:creationId xmlns:a16="http://schemas.microsoft.com/office/drawing/2014/main" id="{54D8FA50-71CB-4D44-B40A-5D7D96BA0464}"/>
+              </a:ext>
+            </a:extLst>
+          </p:cNvPr>
+          <p:cNvSpPr txBox="1"/>
+          <p:nvPr/>
+        </p:nvSpPr>
+        <p:spPr>
+          <a:xfrm>
+            <a:off x="6741230" y="1830514"/>
+            <a:ext cx="4229154" cy="1938992"/>
+          </a:xfrm>
+          <a:prstGeom prst="rect">
+            <a:avLst/>
+          </a:prstGeom>
+          <a:noFill/>
+        </p:spPr>
+        <p:txBody>
+          <a:bodyPr wrap="square">
+            <a:spAutoFit/>
+          </a:bodyPr>
+          <a:lstStyle/>
+          <a:p>
+            <a:r>
+              <a:rPr lang="en-US" sz="2400" dirty="0">
+                <a:latin typeface="Times New Roman" panose="02020603050405020304" pitchFamily="18" charset="0"/>
+                <a:cs typeface="Times New Roman" panose="02020603050405020304" pitchFamily="18" charset="0"/>
+              </a:rPr>
+              <a:t>char a = 5;</a:t>
+            </a:r>
+          </a:p>
+          <a:p>
+            <a:r>
+              <a:rPr lang="en-US" sz="2400" dirty="0">
+                <a:latin typeface="Times New Roman" panose="02020603050405020304" pitchFamily="18" charset="0"/>
+                <a:cs typeface="Times New Roman" panose="02020603050405020304" pitchFamily="18" charset="0"/>
+              </a:rPr>
+              <a:t>char c = a &lt;&lt; 1; // = 10</a:t>
+            </a:r>
+          </a:p>
+          <a:p>
+            <a:r>
+              <a:rPr lang="en-US" sz="2400" dirty="0">
+                <a:latin typeface="Times New Roman" panose="02020603050405020304" pitchFamily="18" charset="0"/>
+                <a:cs typeface="Times New Roman" panose="02020603050405020304" pitchFamily="18" charset="0"/>
+              </a:rPr>
+              <a:t>&lt;&lt; 00000101</a:t>
+            </a:r>
+          </a:p>
+          <a:p>
+            <a:r>
+              <a:rPr lang="en-US" sz="2400" dirty="0">
+                <a:latin typeface="Times New Roman" panose="02020603050405020304" pitchFamily="18" charset="0"/>
+                <a:cs typeface="Times New Roman" panose="02020603050405020304" pitchFamily="18" charset="0"/>
+              </a:rPr>
+              <a:t>      00001010</a:t>
+            </a:r>
+          </a:p>
+          <a:p>
+            <a:endParaRPr lang="en-US" sz="2400" dirty="0">
+              <a:latin typeface="Times New Roman" panose="02020603050405020304" pitchFamily="18" charset="0"/>
+              <a:cs typeface="Times New Roman" panose="02020603050405020304" pitchFamily="18" charset="0"/>
+            </a:endParaRPr>
+          </a:p>
+        </p:txBody>
+      </p:sp>
+      <p:sp>
+        <p:nvSpPr>
+          <p:cNvPr id="7" name="TextBox 6">
+            <a:extLst>
+              <a:ext uri="{FF2B5EF4-FFF2-40B4-BE49-F238E27FC236}">
+                <a16:creationId xmlns:a16="http://schemas.microsoft.com/office/drawing/2014/main" id="{800E483F-A2AD-46C0-AA3D-87A939E3D524}"/>
+              </a:ext>
+            </a:extLst>
+          </p:cNvPr>
+          <p:cNvSpPr txBox="1"/>
+          <p:nvPr/>
+        </p:nvSpPr>
+        <p:spPr>
+          <a:xfrm>
+            <a:off x="6785374" y="4057962"/>
+            <a:ext cx="4229154" cy="1569660"/>
+          </a:xfrm>
+          <a:prstGeom prst="rect">
+            <a:avLst/>
+          </a:prstGeom>
+          <a:noFill/>
+        </p:spPr>
+        <p:txBody>
+          <a:bodyPr wrap="square">
+            <a:spAutoFit/>
+          </a:bodyPr>
+          <a:lstStyle/>
+          <a:p>
+            <a:r>
+              <a:rPr lang="en-US" sz="2400" dirty="0">
+                <a:latin typeface="Times New Roman" panose="02020603050405020304" pitchFamily="18" charset="0"/>
+                <a:cs typeface="Times New Roman" panose="02020603050405020304" pitchFamily="18" charset="0"/>
+              </a:rPr>
+              <a:t>char a = -5;</a:t>
+            </a:r>
+          </a:p>
+          <a:p>
+            <a:r>
+              <a:rPr lang="en-US" sz="2400" dirty="0">
+                <a:latin typeface="Times New Roman" panose="02020603050405020304" pitchFamily="18" charset="0"/>
+                <a:cs typeface="Times New Roman" panose="02020603050405020304" pitchFamily="18" charset="0"/>
+              </a:rPr>
+              <a:t>char c = a &lt;&lt; 1; // = -10</a:t>
+            </a:r>
+          </a:p>
+          <a:p>
+            <a:r>
+              <a:rPr lang="en-US" sz="2400" dirty="0">
+                <a:latin typeface="Times New Roman" panose="02020603050405020304" pitchFamily="18" charset="0"/>
+                <a:cs typeface="Times New Roman" panose="02020603050405020304" pitchFamily="18" charset="0"/>
+              </a:rPr>
+              <a:t>&lt;&lt; 11111011</a:t>
+            </a:r>
+          </a:p>
+          <a:p>
+            <a:r>
+              <a:rPr lang="en-US" sz="2400" dirty="0">
+                <a:latin typeface="Times New Roman" panose="02020603050405020304" pitchFamily="18" charset="0"/>
+                <a:cs typeface="Times New Roman" panose="02020603050405020304" pitchFamily="18" charset="0"/>
+              </a:rPr>
+              <a:t>      11110110</a:t>
+            </a:r>
+          </a:p>
+        </p:txBody>
+      </p:sp>
+    </p:spTree>
+    <p:extLst>
+      <p:ext uri="{BB962C8B-B14F-4D97-AF65-F5344CB8AC3E}">
+        <p14:creationId xmlns:p14="http://schemas.microsoft.com/office/powerpoint/2010/main" val="798688568"/>
+      </p:ext>
+    </p:extLst>
+  </p:cSld>
+  <p:clrMapOvr>
+    <a:masterClrMapping/>
+  </p:clrMapOvr>
+</p:sld>
+</file>
+
+<file path=ppt/slides/slide11.xml><?xml version="1.0" encoding="utf-8"?>
+<p:sld xmlns:a="http://schemas.openxmlformats.org/drawingml/2006/main" xmlns:r="http://schemas.openxmlformats.org/officeDocument/2006/relationships" xmlns:p="http://schemas.openxmlformats.org/presentationml/2006/main">
+  <p:cSld>
+    <p:spTree>
+      <p:nvGrpSpPr>
+        <p:cNvPr id="1" name=""/>
+        <p:cNvGrpSpPr/>
+        <p:nvPr/>
+      </p:nvGrpSpPr>
+      <p:grpSpPr>
+        <a:xfrm>
+          <a:off x="0" y="0"/>
+          <a:ext cx="0" cy="0"/>
+          <a:chOff x="0" y="0"/>
+          <a:chExt cx="0" cy="0"/>
+        </a:xfrm>
+      </p:grpSpPr>
+      <p:sp>
+        <p:nvSpPr>
+          <p:cNvPr id="5" name="Заголовок 3">
+            <a:extLst>
+              <a:ext uri="{FF2B5EF4-FFF2-40B4-BE49-F238E27FC236}">
+                <a16:creationId xmlns:a16="http://schemas.microsoft.com/office/drawing/2014/main" id="{8259CF3A-AC4E-4FB4-B194-DC7CBFC75277}"/>
+              </a:ext>
+            </a:extLst>
+          </p:cNvPr>
+          <p:cNvSpPr txBox="1">
+            <a:spLocks/>
+          </p:cNvSpPr>
+          <p:nvPr/>
+        </p:nvSpPr>
+        <p:spPr>
+          <a:xfrm>
+            <a:off x="1589314" y="497632"/>
+            <a:ext cx="9013371" cy="1164869"/>
+          </a:xfrm>
+          <a:prstGeom prst="rect">
+            <a:avLst/>
+          </a:prstGeom>
+        </p:spPr>
+        <p:txBody>
+          <a:bodyPr vert="horz" lIns="91440" tIns="45720" rIns="91440" bIns="45720" rtlCol="0" anchor="b">
+            <a:normAutofit/>
+          </a:bodyPr>
+          <a:lstStyle>
+            <a:lvl1pPr algn="ctr" defTabSz="914400" rtl="0" eaLnBrk="1" latinLnBrk="0" hangingPunct="1">
+              <a:lnSpc>
+                <a:spcPct val="90000"/>
+              </a:lnSpc>
+              <a:spcBef>
+                <a:spcPct val="0"/>
+              </a:spcBef>
+              <a:buNone/>
+              <a:defRPr sz="6000" kern="1200">
+                <a:solidFill>
+                  <a:schemeClr val="tx1"/>
+                </a:solidFill>
+                <a:latin typeface="+mj-lt"/>
+                <a:ea typeface="+mj-ea"/>
+                <a:cs typeface="+mj-cs"/>
+              </a:defRPr>
+            </a:lvl1pPr>
+          </a:lstStyle>
+          <a:p>
+            <a:r>
+              <a:rPr lang="en-US" dirty="0"/>
+              <a:t>Shift (</a:t>
+            </a:r>
+            <a:r>
+              <a:rPr lang="ru-RU" dirty="0"/>
+              <a:t>Сдвиг</a:t>
+            </a:r>
+            <a:r>
+              <a:rPr lang="en-US" dirty="0"/>
+              <a:t>) &gt;&gt;, &lt;&lt;</a:t>
+            </a:r>
+            <a:endParaRPr lang="ru-RU" dirty="0"/>
+          </a:p>
+        </p:txBody>
+      </p:sp>
+      <p:sp>
+        <p:nvSpPr>
+          <p:cNvPr id="7" name="TextBox 6">
+            <a:extLst>
+              <a:ext uri="{FF2B5EF4-FFF2-40B4-BE49-F238E27FC236}">
+                <a16:creationId xmlns:a16="http://schemas.microsoft.com/office/drawing/2014/main" id="{800E483F-A2AD-46C0-AA3D-87A939E3D524}"/>
+              </a:ext>
+            </a:extLst>
+          </p:cNvPr>
+          <p:cNvSpPr txBox="1"/>
+          <p:nvPr/>
+        </p:nvSpPr>
+        <p:spPr>
+          <a:xfrm>
+            <a:off x="4048480" y="2821945"/>
+            <a:ext cx="4229154" cy="1384995"/>
+          </a:xfrm>
+          <a:prstGeom prst="rect">
+            <a:avLst/>
+          </a:prstGeom>
+          <a:noFill/>
+        </p:spPr>
+        <p:txBody>
+          <a:bodyPr wrap="square">
+            <a:spAutoFit/>
+          </a:bodyPr>
+          <a:lstStyle/>
+          <a:p>
+            <a:r>
+              <a:rPr lang="en-US" sz="2800" dirty="0">
+                <a:latin typeface="Times New Roman" panose="02020603050405020304" pitchFamily="18" charset="0"/>
+                <a:cs typeface="Times New Roman" panose="02020603050405020304" pitchFamily="18" charset="0"/>
+              </a:rPr>
+              <a:t>int a = 0xBAADF00D</a:t>
+            </a:r>
+          </a:p>
+          <a:p>
+            <a:endParaRPr lang="en-US" sz="2800" dirty="0">
+              <a:latin typeface="Times New Roman" panose="02020603050405020304" pitchFamily="18" charset="0"/>
+              <a:cs typeface="Times New Roman" panose="02020603050405020304" pitchFamily="18" charset="0"/>
+            </a:endParaRPr>
+          </a:p>
+          <a:p>
+            <a:r>
+              <a:rPr lang="en-US" sz="2800" dirty="0">
+                <a:latin typeface="Times New Roman" panose="02020603050405020304" pitchFamily="18" charset="0"/>
+                <a:cs typeface="Times New Roman" panose="02020603050405020304" pitchFamily="18" charset="0"/>
+              </a:rPr>
+              <a:t>(a &gt;&gt; 24) &lt;&lt; 8 = ?</a:t>
+            </a:r>
+          </a:p>
+        </p:txBody>
+      </p:sp>
+    </p:spTree>
+    <p:extLst>
+      <p:ext uri="{BB962C8B-B14F-4D97-AF65-F5344CB8AC3E}">
+        <p14:creationId xmlns:p14="http://schemas.microsoft.com/office/powerpoint/2010/main" val="2435610138"/>
+      </p:ext>
+    </p:extLst>
+  </p:cSld>
+  <p:clrMapOvr>
+    <a:masterClrMapping/>
+  </p:clrMapOvr>
+</p:sld>
+</file>
+
+<file path=ppt/slides/slide12.xml><?xml version="1.0" encoding="utf-8"?>
+<p:sld xmlns:a="http://schemas.openxmlformats.org/drawingml/2006/main" xmlns:r="http://schemas.openxmlformats.org/officeDocument/2006/relationships" xmlns:p="http://schemas.openxmlformats.org/presentationml/2006/main">
+  <p:cSld>
+    <p:spTree>
+      <p:nvGrpSpPr>
+        <p:cNvPr id="1" name=""/>
+        <p:cNvGrpSpPr/>
+        <p:nvPr/>
+      </p:nvGrpSpPr>
+      <p:grpSpPr>
+        <a:xfrm>
+          <a:off x="0" y="0"/>
+          <a:ext cx="0" cy="0"/>
+          <a:chOff x="0" y="0"/>
+          <a:chExt cx="0" cy="0"/>
+        </a:xfrm>
+      </p:grpSpPr>
+      <p:sp>
+        <p:nvSpPr>
+          <p:cNvPr id="5" name="Заголовок 3">
+            <a:extLst>
+              <a:ext uri="{FF2B5EF4-FFF2-40B4-BE49-F238E27FC236}">
+                <a16:creationId xmlns:a16="http://schemas.microsoft.com/office/drawing/2014/main" id="{8259CF3A-AC4E-4FB4-B194-DC7CBFC75277}"/>
+              </a:ext>
+            </a:extLst>
+          </p:cNvPr>
+          <p:cNvSpPr txBox="1">
+            <a:spLocks/>
+          </p:cNvSpPr>
+          <p:nvPr/>
+        </p:nvSpPr>
+        <p:spPr>
+          <a:xfrm>
+            <a:off x="1589314" y="497632"/>
+            <a:ext cx="9013371" cy="1164869"/>
+          </a:xfrm>
+          <a:prstGeom prst="rect">
+            <a:avLst/>
+          </a:prstGeom>
+        </p:spPr>
+        <p:txBody>
+          <a:bodyPr vert="horz" lIns="91440" tIns="45720" rIns="91440" bIns="45720" rtlCol="0" anchor="b">
+            <a:normAutofit/>
+          </a:bodyPr>
+          <a:lstStyle>
+            <a:lvl1pPr algn="ctr" defTabSz="914400" rtl="0" eaLnBrk="1" latinLnBrk="0" hangingPunct="1">
+              <a:lnSpc>
+                <a:spcPct val="90000"/>
+              </a:lnSpc>
+              <a:spcBef>
+                <a:spcPct val="0"/>
+              </a:spcBef>
+              <a:buNone/>
+              <a:defRPr sz="6000" kern="1200">
+                <a:solidFill>
+                  <a:schemeClr val="tx1"/>
+                </a:solidFill>
+                <a:latin typeface="+mj-lt"/>
+                <a:ea typeface="+mj-ea"/>
+                <a:cs typeface="+mj-cs"/>
+              </a:defRPr>
+            </a:lvl1pPr>
+          </a:lstStyle>
+          <a:p>
+            <a:r>
+              <a:rPr lang="en-US" dirty="0"/>
+              <a:t>Shift (</a:t>
+            </a:r>
+            <a:r>
+              <a:rPr lang="ru-RU" dirty="0"/>
+              <a:t>Сдвиг</a:t>
+            </a:r>
+            <a:r>
+              <a:rPr lang="en-US" dirty="0"/>
+              <a:t>) &gt;&gt;, &lt;&lt;</a:t>
+            </a:r>
+            <a:endParaRPr lang="ru-RU" dirty="0"/>
+          </a:p>
+        </p:txBody>
+      </p:sp>
+      <p:sp>
+        <p:nvSpPr>
+          <p:cNvPr id="7" name="TextBox 6">
+            <a:extLst>
+              <a:ext uri="{FF2B5EF4-FFF2-40B4-BE49-F238E27FC236}">
+                <a16:creationId xmlns:a16="http://schemas.microsoft.com/office/drawing/2014/main" id="{800E483F-A2AD-46C0-AA3D-87A939E3D524}"/>
+              </a:ext>
+            </a:extLst>
+          </p:cNvPr>
+          <p:cNvSpPr txBox="1"/>
+          <p:nvPr/>
+        </p:nvSpPr>
+        <p:spPr>
+          <a:xfrm>
+            <a:off x="4048480" y="2821945"/>
+            <a:ext cx="4229154" cy="2677656"/>
+          </a:xfrm>
+          <a:prstGeom prst="rect">
+            <a:avLst/>
+          </a:prstGeom>
+          <a:noFill/>
+        </p:spPr>
+        <p:txBody>
+          <a:bodyPr wrap="square">
+            <a:spAutoFit/>
+          </a:bodyPr>
+          <a:lstStyle/>
+          <a:p>
+            <a:r>
+              <a:rPr lang="en-US" sz="2800" dirty="0">
+                <a:latin typeface="Times New Roman" panose="02020603050405020304" pitchFamily="18" charset="0"/>
+                <a:cs typeface="Times New Roman" panose="02020603050405020304" pitchFamily="18" charset="0"/>
+              </a:rPr>
+              <a:t>int a = 0xBAADF00D</a:t>
+            </a:r>
+          </a:p>
+          <a:p>
+            <a:endParaRPr lang="en-US" sz="2800" dirty="0">
+              <a:latin typeface="Times New Roman" panose="02020603050405020304" pitchFamily="18" charset="0"/>
+              <a:cs typeface="Times New Roman" panose="02020603050405020304" pitchFamily="18" charset="0"/>
+            </a:endParaRPr>
+          </a:p>
+          <a:p>
+            <a:r>
+              <a:rPr lang="en-US" sz="2800" dirty="0">
+                <a:latin typeface="Times New Roman" panose="02020603050405020304" pitchFamily="18" charset="0"/>
+                <a:cs typeface="Times New Roman" panose="02020603050405020304" pitchFamily="18" charset="0"/>
+              </a:rPr>
+              <a:t>(a &gt;&gt; 24) &lt;&lt; 8 = ? 0x000000BA</a:t>
+            </a:r>
+          </a:p>
+          <a:p>
+            <a:r>
+              <a:rPr lang="en-US" sz="2800" dirty="0">
+                <a:latin typeface="Times New Roman" panose="02020603050405020304" pitchFamily="18" charset="0"/>
+                <a:cs typeface="Times New Roman" panose="02020603050405020304" pitchFamily="18" charset="0"/>
+              </a:rPr>
+              <a:t>0x0000BA00</a:t>
+            </a:r>
+          </a:p>
+          <a:p>
+            <a:endParaRPr lang="en-US" sz="2800" dirty="0">
+              <a:latin typeface="Times New Roman" panose="02020603050405020304" pitchFamily="18" charset="0"/>
+              <a:cs typeface="Times New Roman" panose="02020603050405020304" pitchFamily="18" charset="0"/>
+            </a:endParaRPr>
+          </a:p>
+        </p:txBody>
+      </p:sp>
+    </p:spTree>
+    <p:extLst>
+      <p:ext uri="{BB962C8B-B14F-4D97-AF65-F5344CB8AC3E}">
+        <p14:creationId xmlns:p14="http://schemas.microsoft.com/office/powerpoint/2010/main" val="3951952996"/>
+      </p:ext>
+    </p:extLst>
+  </p:cSld>
+  <p:clrMapOvr>
+    <a:masterClrMapping/>
+  </p:clrMapOvr>
+</p:sld>
+</file>
+
+<file path=ppt/slides/slide13.xml><?xml version="1.0" encoding="utf-8"?>
+<p:sld xmlns:a="http://schemas.openxmlformats.org/drawingml/2006/main" xmlns:r="http://schemas.openxmlformats.org/officeDocument/2006/relationships" xmlns:p="http://schemas.openxmlformats.org/presentationml/2006/main">
+  <p:cSld>
+    <p:spTree>
+      <p:nvGrpSpPr>
+        <p:cNvPr id="1" name=""/>
+        <p:cNvGrpSpPr/>
+        <p:nvPr/>
+      </p:nvGrpSpPr>
+      <p:grpSpPr>
+        <a:xfrm>
+          <a:off x="0" y="0"/>
+          <a:ext cx="0" cy="0"/>
+          <a:chOff x="0" y="0"/>
+          <a:chExt cx="0" cy="0"/>
+        </a:xfrm>
+      </p:grpSpPr>
+      <p:sp>
+        <p:nvSpPr>
+          <p:cNvPr id="5" name="Заголовок 3">
+            <a:extLst>
+              <a:ext uri="{FF2B5EF4-FFF2-40B4-BE49-F238E27FC236}">
+                <a16:creationId xmlns:a16="http://schemas.microsoft.com/office/drawing/2014/main" id="{8259CF3A-AC4E-4FB4-B194-DC7CBFC75277}"/>
+              </a:ext>
+            </a:extLst>
+          </p:cNvPr>
+          <p:cNvSpPr txBox="1">
+            <a:spLocks/>
+          </p:cNvSpPr>
+          <p:nvPr/>
+        </p:nvSpPr>
+        <p:spPr>
+          <a:xfrm>
+            <a:off x="1589314" y="497632"/>
+            <a:ext cx="9013371" cy="1164869"/>
+          </a:xfrm>
+          <a:prstGeom prst="rect">
+            <a:avLst/>
+          </a:prstGeom>
+        </p:spPr>
+        <p:txBody>
+          <a:bodyPr vert="horz" lIns="91440" tIns="45720" rIns="91440" bIns="45720" rtlCol="0" anchor="b">
+            <a:normAutofit/>
+          </a:bodyPr>
+          <a:lstStyle>
+            <a:lvl1pPr algn="ctr" defTabSz="914400" rtl="0" eaLnBrk="1" latinLnBrk="0" hangingPunct="1">
+              <a:lnSpc>
+                <a:spcPct val="90000"/>
+              </a:lnSpc>
+              <a:spcBef>
+                <a:spcPct val="0"/>
+              </a:spcBef>
+              <a:buNone/>
+              <a:defRPr sz="6000" kern="1200">
+                <a:solidFill>
+                  <a:schemeClr val="tx1"/>
+                </a:solidFill>
+                <a:latin typeface="+mj-lt"/>
+                <a:ea typeface="+mj-ea"/>
+                <a:cs typeface="+mj-cs"/>
+              </a:defRPr>
+            </a:lvl1pPr>
+          </a:lstStyle>
+          <a:p>
+            <a:r>
+              <a:rPr lang="en-US" dirty="0"/>
+              <a:t>Shift and &amp;</a:t>
+            </a:r>
+            <a:endParaRPr lang="ru-RU" dirty="0"/>
+          </a:p>
+        </p:txBody>
+      </p:sp>
+      <p:sp>
+        <p:nvSpPr>
+          <p:cNvPr id="4" name="TextBox 3">
+            <a:extLst>
+              <a:ext uri="{FF2B5EF4-FFF2-40B4-BE49-F238E27FC236}">
+                <a16:creationId xmlns:a16="http://schemas.microsoft.com/office/drawing/2014/main" id="{B9D59634-A052-4F56-A795-8336D0FC0D11}"/>
+              </a:ext>
+            </a:extLst>
+          </p:cNvPr>
+          <p:cNvSpPr txBox="1"/>
+          <p:nvPr/>
+        </p:nvSpPr>
+        <p:spPr>
+          <a:xfrm>
+            <a:off x="2968120" y="2361591"/>
+            <a:ext cx="7756634" cy="3170099"/>
+          </a:xfrm>
+          <a:prstGeom prst="rect">
+            <a:avLst/>
+          </a:prstGeom>
+          <a:noFill/>
+        </p:spPr>
+        <p:txBody>
+          <a:bodyPr wrap="square">
+            <a:spAutoFit/>
+          </a:bodyPr>
+          <a:lstStyle/>
+          <a:p>
+            <a:r>
+              <a:rPr lang="en-US" sz="2000" b="0" dirty="0">
+                <a:solidFill>
+                  <a:srgbClr val="569CD6"/>
+                </a:solidFill>
+                <a:effectLst/>
+                <a:latin typeface="Consolas" panose="020B0609020204030204" pitchFamily="49" charset="0"/>
+              </a:rPr>
+              <a:t>unsigned</a:t>
+            </a:r>
+            <a:r>
+              <a:rPr lang="en-US" sz="2000" b="0" dirty="0">
+                <a:solidFill>
+                  <a:srgbClr val="CCCCCC"/>
+                </a:solidFill>
+                <a:effectLst/>
+                <a:latin typeface="Consolas" panose="020B0609020204030204" pitchFamily="49" charset="0"/>
+              </a:rPr>
+              <a:t> </a:t>
+            </a:r>
+            <a:r>
+              <a:rPr lang="en-US" sz="2000" b="0" dirty="0">
+                <a:solidFill>
+                  <a:srgbClr val="569CD6"/>
+                </a:solidFill>
+                <a:effectLst/>
+                <a:latin typeface="Consolas" panose="020B0609020204030204" pitchFamily="49" charset="0"/>
+              </a:rPr>
+              <a:t>int</a:t>
+            </a:r>
+            <a:r>
+              <a:rPr lang="en-US" sz="2000" b="0" dirty="0">
+                <a:solidFill>
+                  <a:srgbClr val="CCCCCC"/>
+                </a:solidFill>
+                <a:effectLst/>
+                <a:latin typeface="Consolas" panose="020B0609020204030204" pitchFamily="49" charset="0"/>
+              </a:rPr>
+              <a:t> </a:t>
+            </a:r>
+            <a:r>
+              <a:rPr lang="en-US" sz="2000" b="0" dirty="0">
+                <a:solidFill>
+                  <a:srgbClr val="9CDCFE"/>
+                </a:solidFill>
+                <a:effectLst/>
+                <a:latin typeface="Consolas" panose="020B0609020204030204" pitchFamily="49" charset="0"/>
+              </a:rPr>
+              <a:t>a</a:t>
+            </a:r>
+            <a:r>
+              <a:rPr lang="en-US" sz="2000" b="0" dirty="0">
+                <a:solidFill>
+                  <a:srgbClr val="CCCCCC"/>
+                </a:solidFill>
+                <a:effectLst/>
+                <a:latin typeface="Consolas" panose="020B0609020204030204" pitchFamily="49" charset="0"/>
+              </a:rPr>
+              <a:t> </a:t>
+            </a:r>
+            <a:r>
+              <a:rPr lang="en-US" sz="2000" b="0" dirty="0">
+                <a:solidFill>
+                  <a:srgbClr val="D4D4D4"/>
+                </a:solidFill>
+                <a:effectLst/>
+                <a:latin typeface="Consolas" panose="020B0609020204030204" pitchFamily="49" charset="0"/>
+              </a:rPr>
+              <a:t>=</a:t>
+            </a:r>
+            <a:r>
+              <a:rPr lang="en-US" sz="2000" b="0" dirty="0">
+                <a:solidFill>
+                  <a:srgbClr val="CCCCCC"/>
+                </a:solidFill>
+                <a:effectLst/>
+                <a:latin typeface="Consolas" panose="020B0609020204030204" pitchFamily="49" charset="0"/>
+              </a:rPr>
+              <a:t> </a:t>
+            </a:r>
+            <a:r>
+              <a:rPr lang="en-US" sz="2000" b="0" dirty="0">
+                <a:solidFill>
+                  <a:srgbClr val="B5CEA8"/>
+                </a:solidFill>
+                <a:effectLst/>
+                <a:latin typeface="Consolas" panose="020B0609020204030204" pitchFamily="49" charset="0"/>
+              </a:rPr>
+              <a:t>0x00C0FFEE</a:t>
+            </a:r>
+            <a:r>
+              <a:rPr lang="en-US" sz="2000" b="0" dirty="0">
+                <a:solidFill>
+                  <a:srgbClr val="CCCCCC"/>
+                </a:solidFill>
+                <a:effectLst/>
+                <a:latin typeface="Consolas" panose="020B0609020204030204" pitchFamily="49" charset="0"/>
+              </a:rPr>
+              <a:t>;</a:t>
+            </a:r>
+          </a:p>
+          <a:p>
+            <a:r>
+              <a:rPr lang="en-US" sz="2000" b="0" dirty="0">
+                <a:solidFill>
+                  <a:srgbClr val="569CD6"/>
+                </a:solidFill>
+                <a:effectLst/>
+                <a:latin typeface="Consolas" panose="020B0609020204030204" pitchFamily="49" charset="0"/>
+              </a:rPr>
+              <a:t>unsigned</a:t>
+            </a:r>
+            <a:r>
+              <a:rPr lang="en-US" sz="2000" b="0" dirty="0">
+                <a:solidFill>
+                  <a:srgbClr val="CCCCCC"/>
+                </a:solidFill>
+                <a:effectLst/>
+                <a:latin typeface="Consolas" panose="020B0609020204030204" pitchFamily="49" charset="0"/>
+              </a:rPr>
+              <a:t> </a:t>
+            </a:r>
+            <a:r>
+              <a:rPr lang="en-US" sz="2000" b="0" dirty="0">
+                <a:solidFill>
+                  <a:srgbClr val="569CD6"/>
+                </a:solidFill>
+                <a:effectLst/>
+                <a:latin typeface="Consolas" panose="020B0609020204030204" pitchFamily="49" charset="0"/>
+              </a:rPr>
+              <a:t>char</a:t>
+            </a:r>
+            <a:r>
+              <a:rPr lang="en-US" sz="2000" b="0" dirty="0">
+                <a:solidFill>
+                  <a:srgbClr val="CCCCCC"/>
+                </a:solidFill>
+                <a:effectLst/>
+                <a:latin typeface="Consolas" panose="020B0609020204030204" pitchFamily="49" charset="0"/>
+              </a:rPr>
+              <a:t> </a:t>
+            </a:r>
+            <a:r>
+              <a:rPr lang="en-US" sz="2000" b="0" dirty="0">
+                <a:solidFill>
+                  <a:srgbClr val="9CDCFE"/>
+                </a:solidFill>
+                <a:effectLst/>
+                <a:latin typeface="Consolas" panose="020B0609020204030204" pitchFamily="49" charset="0"/>
+              </a:rPr>
+              <a:t>c</a:t>
+            </a:r>
+            <a:r>
+              <a:rPr lang="en-US" sz="2000" b="0" dirty="0">
+                <a:solidFill>
+                  <a:srgbClr val="CCCCCC"/>
+                </a:solidFill>
+                <a:effectLst/>
+                <a:latin typeface="Consolas" panose="020B0609020204030204" pitchFamily="49" charset="0"/>
+              </a:rPr>
+              <a:t>;</a:t>
+            </a:r>
+          </a:p>
+          <a:p>
+            <a:r>
+              <a:rPr lang="en-US" sz="2000" b="0" dirty="0">
+                <a:solidFill>
+                  <a:srgbClr val="9CDCFE"/>
+                </a:solidFill>
+                <a:effectLst/>
+                <a:latin typeface="Consolas" panose="020B0609020204030204" pitchFamily="49" charset="0"/>
+              </a:rPr>
+              <a:t>c</a:t>
+            </a:r>
+            <a:r>
+              <a:rPr lang="en-US" sz="2000" b="0" dirty="0">
+                <a:solidFill>
+                  <a:srgbClr val="CCCCCC"/>
+                </a:solidFill>
+                <a:effectLst/>
+                <a:latin typeface="Consolas" panose="020B0609020204030204" pitchFamily="49" charset="0"/>
+              </a:rPr>
+              <a:t> </a:t>
+            </a:r>
+            <a:r>
+              <a:rPr lang="en-US" sz="2000" b="0" dirty="0">
+                <a:solidFill>
+                  <a:srgbClr val="D4D4D4"/>
+                </a:solidFill>
+                <a:effectLst/>
+                <a:latin typeface="Consolas" panose="020B0609020204030204" pitchFamily="49" charset="0"/>
+              </a:rPr>
+              <a:t>=</a:t>
+            </a:r>
+            <a:r>
+              <a:rPr lang="en-US" sz="2000" b="0" dirty="0">
+                <a:solidFill>
+                  <a:srgbClr val="CCCCCC"/>
+                </a:solidFill>
+                <a:effectLst/>
+                <a:latin typeface="Consolas" panose="020B0609020204030204" pitchFamily="49" charset="0"/>
+              </a:rPr>
+              <a:t> (</a:t>
+            </a:r>
+            <a:r>
+              <a:rPr lang="en-US" sz="2000" b="0" dirty="0">
+                <a:solidFill>
+                  <a:srgbClr val="9CDCFE"/>
+                </a:solidFill>
+                <a:effectLst/>
+                <a:latin typeface="Consolas" panose="020B0609020204030204" pitchFamily="49" charset="0"/>
+              </a:rPr>
+              <a:t>a</a:t>
+            </a:r>
+            <a:r>
+              <a:rPr lang="en-US" sz="2000" b="0" dirty="0">
+                <a:solidFill>
+                  <a:srgbClr val="CCCCCC"/>
+                </a:solidFill>
+                <a:effectLst/>
+                <a:latin typeface="Consolas" panose="020B0609020204030204" pitchFamily="49" charset="0"/>
+              </a:rPr>
+              <a:t> </a:t>
+            </a:r>
+            <a:r>
+              <a:rPr lang="en-US" sz="2000" b="0" dirty="0">
+                <a:solidFill>
+                  <a:srgbClr val="D4D4D4"/>
+                </a:solidFill>
+                <a:effectLst/>
+                <a:latin typeface="Consolas" panose="020B0609020204030204" pitchFamily="49" charset="0"/>
+              </a:rPr>
+              <a:t>&amp;</a:t>
+            </a:r>
+            <a:r>
+              <a:rPr lang="en-US" sz="2000" b="0" dirty="0">
+                <a:solidFill>
+                  <a:srgbClr val="CCCCCC"/>
+                </a:solidFill>
+                <a:effectLst/>
+                <a:latin typeface="Consolas" panose="020B0609020204030204" pitchFamily="49" charset="0"/>
+              </a:rPr>
+              <a:t> </a:t>
+            </a:r>
+            <a:r>
+              <a:rPr lang="en-US" sz="2000" b="0" dirty="0">
+                <a:solidFill>
+                  <a:srgbClr val="B5CEA8"/>
+                </a:solidFill>
+                <a:effectLst/>
+                <a:latin typeface="Consolas" panose="020B0609020204030204" pitchFamily="49" charset="0"/>
+              </a:rPr>
+              <a:t>0x000000FF</a:t>
+            </a:r>
+            <a:r>
+              <a:rPr lang="en-US" sz="2000" b="0" dirty="0">
+                <a:solidFill>
+                  <a:srgbClr val="CCCCCC"/>
+                </a:solidFill>
+                <a:effectLst/>
+                <a:latin typeface="Consolas" panose="020B0609020204030204" pitchFamily="49" charset="0"/>
+              </a:rPr>
+              <a:t>);</a:t>
+            </a:r>
+            <a:r>
+              <a:rPr lang="en-US" sz="2000" b="0" dirty="0">
+                <a:solidFill>
+                  <a:srgbClr val="6A9955"/>
+                </a:solidFill>
+                <a:effectLst/>
+                <a:latin typeface="Consolas" panose="020B0609020204030204" pitchFamily="49" charset="0"/>
+              </a:rPr>
+              <a:t> // </a:t>
+            </a:r>
+            <a:r>
+              <a:rPr lang="ru-RU" sz="2000" b="0" dirty="0">
+                <a:solidFill>
+                  <a:srgbClr val="6A9955"/>
+                </a:solidFill>
+                <a:effectLst/>
+                <a:latin typeface="Consolas" panose="020B0609020204030204" pitchFamily="49" charset="0"/>
+              </a:rPr>
+              <a:t>тоже что и</a:t>
+            </a:r>
+            <a:r>
+              <a:rPr lang="en-US" sz="2000" b="0" dirty="0">
+                <a:solidFill>
+                  <a:srgbClr val="6A9955"/>
+                </a:solidFill>
+                <a:effectLst/>
+                <a:latin typeface="Consolas" panose="020B0609020204030204" pitchFamily="49" charset="0"/>
+              </a:rPr>
+              <a:t> </a:t>
+            </a:r>
+            <a:r>
+              <a:rPr lang="ru-RU" sz="2000" b="0" dirty="0">
+                <a:solidFill>
+                  <a:srgbClr val="6A9955"/>
+                </a:solidFill>
+                <a:effectLst/>
+                <a:latin typeface="Consolas" panose="020B0609020204030204" pitchFamily="49" charset="0"/>
+              </a:rPr>
+              <a:t>(</a:t>
+            </a:r>
+            <a:r>
+              <a:rPr lang="en-US" sz="2000" b="0" dirty="0">
+                <a:solidFill>
+                  <a:srgbClr val="6A9955"/>
+                </a:solidFill>
+                <a:effectLst/>
+                <a:latin typeface="Consolas" panose="020B0609020204030204" pitchFamily="49" charset="0"/>
+              </a:rPr>
+              <a:t>a &amp; 0xFF</a:t>
+            </a:r>
+            <a:r>
+              <a:rPr lang="ru-RU" sz="2000" b="0" dirty="0">
+                <a:solidFill>
+                  <a:srgbClr val="6A9955"/>
+                </a:solidFill>
+                <a:effectLst/>
+                <a:latin typeface="Consolas" panose="020B0609020204030204" pitchFamily="49" charset="0"/>
+              </a:rPr>
+              <a:t>)</a:t>
+            </a:r>
+            <a:endParaRPr lang="en-US" sz="2000" b="0" dirty="0">
+              <a:solidFill>
+                <a:srgbClr val="CCCCCC"/>
+              </a:solidFill>
+              <a:effectLst/>
+              <a:latin typeface="Consolas" panose="020B0609020204030204" pitchFamily="49" charset="0"/>
+            </a:endParaRPr>
+          </a:p>
+          <a:p>
+            <a:r>
+              <a:rPr lang="en-US" sz="2000" b="0" dirty="0" err="1">
+                <a:solidFill>
+                  <a:srgbClr val="DCDCAA"/>
+                </a:solidFill>
+                <a:effectLst/>
+                <a:latin typeface="Consolas" panose="020B0609020204030204" pitchFamily="49" charset="0"/>
+              </a:rPr>
+              <a:t>printf</a:t>
+            </a:r>
+            <a:r>
+              <a:rPr lang="en-US" sz="2000" b="0" dirty="0">
+                <a:solidFill>
+                  <a:srgbClr val="CCCCCC"/>
+                </a:solidFill>
+                <a:effectLst/>
+                <a:latin typeface="Consolas" panose="020B0609020204030204" pitchFamily="49" charset="0"/>
+              </a:rPr>
+              <a:t>(</a:t>
+            </a:r>
+            <a:r>
+              <a:rPr lang="en-US" sz="2000" b="0" dirty="0">
+                <a:solidFill>
+                  <a:srgbClr val="CE9178"/>
+                </a:solidFill>
+                <a:effectLst/>
+                <a:latin typeface="Consolas" panose="020B0609020204030204" pitchFamily="49" charset="0"/>
+              </a:rPr>
+              <a:t>"first byte of a = </a:t>
+            </a:r>
+            <a:r>
+              <a:rPr lang="en-US" sz="2000" b="0" dirty="0">
+                <a:solidFill>
+                  <a:srgbClr val="9CDCFE"/>
+                </a:solidFill>
+                <a:effectLst/>
+                <a:latin typeface="Consolas" panose="020B0609020204030204" pitchFamily="49" charset="0"/>
+              </a:rPr>
+              <a:t>%x</a:t>
+            </a:r>
+            <a:r>
+              <a:rPr lang="en-US" sz="2000" b="0" dirty="0">
+                <a:solidFill>
+                  <a:srgbClr val="D7BA7D"/>
+                </a:solidFill>
+                <a:effectLst/>
+                <a:latin typeface="Consolas" panose="020B0609020204030204" pitchFamily="49" charset="0"/>
+              </a:rPr>
+              <a:t>\n</a:t>
+            </a:r>
+            <a:r>
+              <a:rPr lang="en-US" sz="2000" b="0" dirty="0">
+                <a:solidFill>
+                  <a:srgbClr val="CE9178"/>
+                </a:solidFill>
+                <a:effectLst/>
+                <a:latin typeface="Consolas" panose="020B0609020204030204" pitchFamily="49" charset="0"/>
+              </a:rPr>
+              <a:t>"</a:t>
+            </a:r>
+            <a:r>
+              <a:rPr lang="en-US" sz="2000" b="0" dirty="0">
+                <a:solidFill>
+                  <a:srgbClr val="CCCCCC"/>
+                </a:solidFill>
+                <a:effectLst/>
+                <a:latin typeface="Consolas" panose="020B0609020204030204" pitchFamily="49" charset="0"/>
+              </a:rPr>
+              <a:t>, </a:t>
+            </a:r>
+            <a:r>
+              <a:rPr lang="en-US" sz="2000" b="0" dirty="0">
+                <a:solidFill>
+                  <a:srgbClr val="9CDCFE"/>
+                </a:solidFill>
+                <a:effectLst/>
+                <a:latin typeface="Consolas" panose="020B0609020204030204" pitchFamily="49" charset="0"/>
+              </a:rPr>
+              <a:t>c</a:t>
+            </a:r>
+            <a:r>
+              <a:rPr lang="en-US" sz="2000" b="0" dirty="0">
+                <a:solidFill>
+                  <a:srgbClr val="CCCCCC"/>
+                </a:solidFill>
+                <a:effectLst/>
+                <a:latin typeface="Consolas" panose="020B0609020204030204" pitchFamily="49" charset="0"/>
+              </a:rPr>
+              <a:t>);</a:t>
+            </a:r>
+            <a:r>
+              <a:rPr lang="en-US" sz="2000" b="0" dirty="0">
+                <a:solidFill>
+                  <a:srgbClr val="6A9955"/>
+                </a:solidFill>
+                <a:effectLst/>
+                <a:latin typeface="Consolas" panose="020B0609020204030204" pitchFamily="49" charset="0"/>
+              </a:rPr>
+              <a:t> // c == 0xEE</a:t>
+            </a:r>
+            <a:endParaRPr lang="en-US" sz="2000" b="0" dirty="0">
+              <a:solidFill>
+                <a:srgbClr val="CCCCCC"/>
+              </a:solidFill>
+              <a:effectLst/>
+              <a:latin typeface="Consolas" panose="020B0609020204030204" pitchFamily="49" charset="0"/>
+            </a:endParaRPr>
+          </a:p>
+          <a:p>
+            <a:br>
+              <a:rPr lang="en-US" sz="2000" b="0" dirty="0">
+                <a:solidFill>
+                  <a:srgbClr val="CCCCCC"/>
+                </a:solidFill>
+                <a:effectLst/>
+                <a:latin typeface="Consolas" panose="020B0609020204030204" pitchFamily="49" charset="0"/>
+              </a:rPr>
+            </a:br>
+            <a:r>
+              <a:rPr lang="en-US" sz="2000" b="0" dirty="0">
+                <a:solidFill>
+                  <a:srgbClr val="9CDCFE"/>
+                </a:solidFill>
+                <a:effectLst/>
+                <a:latin typeface="Consolas" panose="020B0609020204030204" pitchFamily="49" charset="0"/>
+              </a:rPr>
+              <a:t>c</a:t>
+            </a:r>
+            <a:r>
+              <a:rPr lang="en-US" sz="2000" b="0" dirty="0">
+                <a:solidFill>
+                  <a:srgbClr val="CCCCCC"/>
+                </a:solidFill>
+                <a:effectLst/>
+                <a:latin typeface="Consolas" panose="020B0609020204030204" pitchFamily="49" charset="0"/>
+              </a:rPr>
+              <a:t> </a:t>
+            </a:r>
+            <a:r>
+              <a:rPr lang="en-US" sz="2000" b="0" dirty="0">
+                <a:solidFill>
+                  <a:srgbClr val="D4D4D4"/>
+                </a:solidFill>
+                <a:effectLst/>
+                <a:latin typeface="Consolas" panose="020B0609020204030204" pitchFamily="49" charset="0"/>
+              </a:rPr>
+              <a:t>=</a:t>
+            </a:r>
+            <a:r>
+              <a:rPr lang="en-US" sz="2000" b="0" dirty="0">
+                <a:solidFill>
+                  <a:srgbClr val="CCCCCC"/>
+                </a:solidFill>
+                <a:effectLst/>
+                <a:latin typeface="Consolas" panose="020B0609020204030204" pitchFamily="49" charset="0"/>
+              </a:rPr>
+              <a:t> ((</a:t>
+            </a:r>
+            <a:r>
+              <a:rPr lang="en-US" sz="2000" b="0" dirty="0">
+                <a:solidFill>
+                  <a:srgbClr val="9CDCFE"/>
+                </a:solidFill>
+                <a:effectLst/>
+                <a:latin typeface="Consolas" panose="020B0609020204030204" pitchFamily="49" charset="0"/>
+              </a:rPr>
+              <a:t>a</a:t>
+            </a:r>
+            <a:r>
+              <a:rPr lang="en-US" sz="2000" b="0" dirty="0">
+                <a:solidFill>
+                  <a:srgbClr val="CCCCCC"/>
+                </a:solidFill>
+                <a:effectLst/>
+                <a:latin typeface="Consolas" panose="020B0609020204030204" pitchFamily="49" charset="0"/>
+              </a:rPr>
+              <a:t> </a:t>
+            </a:r>
+            <a:r>
+              <a:rPr lang="en-US" sz="2000" b="0" dirty="0">
+                <a:solidFill>
+                  <a:srgbClr val="D4D4D4"/>
+                </a:solidFill>
+                <a:effectLst/>
+                <a:latin typeface="Consolas" panose="020B0609020204030204" pitchFamily="49" charset="0"/>
+              </a:rPr>
+              <a:t>&gt;&gt;</a:t>
+            </a:r>
+            <a:r>
+              <a:rPr lang="en-US" sz="2000" b="0" dirty="0">
+                <a:solidFill>
+                  <a:srgbClr val="CCCCCC"/>
+                </a:solidFill>
+                <a:effectLst/>
+                <a:latin typeface="Consolas" panose="020B0609020204030204" pitchFamily="49" charset="0"/>
+              </a:rPr>
+              <a:t> </a:t>
+            </a:r>
+            <a:r>
+              <a:rPr lang="en-US" sz="2000" b="0" dirty="0">
+                <a:solidFill>
+                  <a:srgbClr val="B5CEA8"/>
+                </a:solidFill>
+                <a:effectLst/>
+                <a:latin typeface="Consolas" panose="020B0609020204030204" pitchFamily="49" charset="0"/>
+              </a:rPr>
+              <a:t>8</a:t>
+            </a:r>
+            <a:r>
+              <a:rPr lang="en-US" sz="2000" b="0" dirty="0">
+                <a:solidFill>
+                  <a:srgbClr val="CCCCCC"/>
+                </a:solidFill>
+                <a:effectLst/>
+                <a:latin typeface="Consolas" panose="020B0609020204030204" pitchFamily="49" charset="0"/>
+              </a:rPr>
+              <a:t>) </a:t>
+            </a:r>
+            <a:r>
+              <a:rPr lang="en-US" sz="2000" b="0" dirty="0">
+                <a:solidFill>
+                  <a:srgbClr val="D4D4D4"/>
+                </a:solidFill>
+                <a:effectLst/>
+                <a:latin typeface="Consolas" panose="020B0609020204030204" pitchFamily="49" charset="0"/>
+              </a:rPr>
+              <a:t>&amp;</a:t>
+            </a:r>
+            <a:r>
+              <a:rPr lang="en-US" sz="2000" b="0" dirty="0">
+                <a:solidFill>
+                  <a:srgbClr val="CCCCCC"/>
+                </a:solidFill>
+                <a:effectLst/>
+                <a:latin typeface="Consolas" panose="020B0609020204030204" pitchFamily="49" charset="0"/>
+              </a:rPr>
+              <a:t> </a:t>
+            </a:r>
+            <a:r>
+              <a:rPr lang="en-US" sz="2000" b="0" dirty="0">
+                <a:solidFill>
+                  <a:srgbClr val="B5CEA8"/>
+                </a:solidFill>
+                <a:effectLst/>
+                <a:latin typeface="Consolas" panose="020B0609020204030204" pitchFamily="49" charset="0"/>
+              </a:rPr>
+              <a:t>0x000000FF</a:t>
+            </a:r>
+            <a:r>
+              <a:rPr lang="en-US" sz="2000" b="0" dirty="0">
+                <a:solidFill>
+                  <a:srgbClr val="CCCCCC"/>
+                </a:solidFill>
+                <a:effectLst/>
+                <a:latin typeface="Consolas" panose="020B0609020204030204" pitchFamily="49" charset="0"/>
+              </a:rPr>
+              <a:t>); </a:t>
+            </a:r>
+          </a:p>
+          <a:p>
+            <a:r>
+              <a:rPr lang="en-US" sz="2000" b="0" dirty="0" err="1">
+                <a:solidFill>
+                  <a:srgbClr val="DCDCAA"/>
+                </a:solidFill>
+                <a:effectLst/>
+                <a:latin typeface="Consolas" panose="020B0609020204030204" pitchFamily="49" charset="0"/>
+              </a:rPr>
+              <a:t>printf</a:t>
+            </a:r>
+            <a:r>
+              <a:rPr lang="en-US" sz="2000" b="0" dirty="0">
+                <a:solidFill>
+                  <a:srgbClr val="CCCCCC"/>
+                </a:solidFill>
+                <a:effectLst/>
+                <a:latin typeface="Consolas" panose="020B0609020204030204" pitchFamily="49" charset="0"/>
+              </a:rPr>
+              <a:t>(</a:t>
+            </a:r>
+            <a:r>
+              <a:rPr lang="en-US" sz="2000" b="0" dirty="0">
+                <a:solidFill>
+                  <a:srgbClr val="CE9178"/>
+                </a:solidFill>
+                <a:effectLst/>
+                <a:latin typeface="Consolas" panose="020B0609020204030204" pitchFamily="49" charset="0"/>
+              </a:rPr>
+              <a:t>"second byte of a = </a:t>
+            </a:r>
+            <a:r>
+              <a:rPr lang="en-US" sz="2000" b="0" dirty="0">
+                <a:solidFill>
+                  <a:srgbClr val="9CDCFE"/>
+                </a:solidFill>
+                <a:effectLst/>
+                <a:latin typeface="Consolas" panose="020B0609020204030204" pitchFamily="49" charset="0"/>
+              </a:rPr>
+              <a:t>%x</a:t>
+            </a:r>
+            <a:r>
+              <a:rPr lang="en-US" sz="2000" b="0" dirty="0">
+                <a:solidFill>
+                  <a:srgbClr val="D7BA7D"/>
+                </a:solidFill>
+                <a:effectLst/>
+                <a:latin typeface="Consolas" panose="020B0609020204030204" pitchFamily="49" charset="0"/>
+              </a:rPr>
+              <a:t>\n</a:t>
+            </a:r>
+            <a:r>
+              <a:rPr lang="en-US" sz="2000" b="0" dirty="0">
+                <a:solidFill>
+                  <a:srgbClr val="CE9178"/>
+                </a:solidFill>
+                <a:effectLst/>
+                <a:latin typeface="Consolas" panose="020B0609020204030204" pitchFamily="49" charset="0"/>
+              </a:rPr>
+              <a:t>"</a:t>
+            </a:r>
+            <a:r>
+              <a:rPr lang="en-US" sz="2000" b="0" dirty="0">
+                <a:solidFill>
+                  <a:srgbClr val="CCCCCC"/>
+                </a:solidFill>
+                <a:effectLst/>
+                <a:latin typeface="Consolas" panose="020B0609020204030204" pitchFamily="49" charset="0"/>
+              </a:rPr>
+              <a:t>, </a:t>
+            </a:r>
+            <a:r>
+              <a:rPr lang="en-US" sz="2000" b="0" dirty="0">
+                <a:solidFill>
+                  <a:srgbClr val="9CDCFE"/>
+                </a:solidFill>
+                <a:effectLst/>
+                <a:latin typeface="Consolas" panose="020B0609020204030204" pitchFamily="49" charset="0"/>
+              </a:rPr>
+              <a:t>c</a:t>
+            </a:r>
+            <a:r>
+              <a:rPr lang="en-US" sz="2000" b="0" dirty="0">
+                <a:solidFill>
+                  <a:srgbClr val="CCCCCC"/>
+                </a:solidFill>
+                <a:effectLst/>
+                <a:latin typeface="Consolas" panose="020B0609020204030204" pitchFamily="49" charset="0"/>
+              </a:rPr>
+              <a:t>);</a:t>
+            </a:r>
+            <a:r>
+              <a:rPr lang="en-US" sz="2000" b="0" dirty="0">
+                <a:solidFill>
+                  <a:srgbClr val="6A9955"/>
+                </a:solidFill>
+                <a:effectLst/>
+                <a:latin typeface="Consolas" panose="020B0609020204030204" pitchFamily="49" charset="0"/>
+              </a:rPr>
+              <a:t> // c == 0xFF</a:t>
+            </a:r>
+            <a:endParaRPr lang="en-US" sz="2000" b="0" dirty="0">
+              <a:solidFill>
+                <a:srgbClr val="CCCCCC"/>
+              </a:solidFill>
+              <a:effectLst/>
+              <a:latin typeface="Consolas" panose="020B0609020204030204" pitchFamily="49" charset="0"/>
+            </a:endParaRPr>
+          </a:p>
+          <a:p>
+            <a:br>
+              <a:rPr lang="en-US" sz="2000" b="0" dirty="0">
+                <a:solidFill>
+                  <a:srgbClr val="CCCCCC"/>
+                </a:solidFill>
+                <a:effectLst/>
+                <a:latin typeface="Consolas" panose="020B0609020204030204" pitchFamily="49" charset="0"/>
+              </a:rPr>
+            </a:br>
+            <a:endParaRPr lang="en-US" sz="2000" b="0" dirty="0">
+              <a:solidFill>
+                <a:srgbClr val="CCCCCC"/>
+              </a:solidFill>
+              <a:effectLst/>
+              <a:latin typeface="Consolas" panose="020B0609020204030204" pitchFamily="49" charset="0"/>
+            </a:endParaRPr>
+          </a:p>
+          <a:p>
+            <a:endParaRPr lang="en-US" sz="2000" dirty="0">
+              <a:latin typeface="Times New Roman" panose="02020603050405020304" pitchFamily="18" charset="0"/>
+              <a:cs typeface="Times New Roman" panose="02020603050405020304" pitchFamily="18" charset="0"/>
+            </a:endParaRPr>
+          </a:p>
+        </p:txBody>
+      </p:sp>
+    </p:spTree>
+    <p:extLst>
+      <p:ext uri="{BB962C8B-B14F-4D97-AF65-F5344CB8AC3E}">
+        <p14:creationId xmlns:p14="http://schemas.microsoft.com/office/powerpoint/2010/main" val="1607211335"/>
+      </p:ext>
+    </p:extLst>
+  </p:cSld>
+  <p:clrMapOvr>
+    <a:masterClrMapping/>
+  </p:clrMapOvr>
+</p:sld>
+</file>
+
+<file path=ppt/slides/slide14.xml><?xml version="1.0" encoding="utf-8"?>
+<p:sld xmlns:a="http://schemas.openxmlformats.org/drawingml/2006/main" xmlns:r="http://schemas.openxmlformats.org/officeDocument/2006/relationships" xmlns:p="http://schemas.openxmlformats.org/presentationml/2006/main">
+  <p:cSld>
+    <p:spTree>
+      <p:nvGrpSpPr>
+        <p:cNvPr id="1" name=""/>
+        <p:cNvGrpSpPr/>
+        <p:nvPr/>
+      </p:nvGrpSpPr>
+      <p:grpSpPr>
+        <a:xfrm>
+          <a:off x="0" y="0"/>
+          <a:ext cx="0" cy="0"/>
+          <a:chOff x="0" y="0"/>
+          <a:chExt cx="0" cy="0"/>
+        </a:xfrm>
+      </p:grpSpPr>
+      <p:sp>
+        <p:nvSpPr>
+          <p:cNvPr id="5" name="Заголовок 3">
+            <a:extLst>
+              <a:ext uri="{FF2B5EF4-FFF2-40B4-BE49-F238E27FC236}">
+                <a16:creationId xmlns:a16="http://schemas.microsoft.com/office/drawing/2014/main" id="{8259CF3A-AC4E-4FB4-B194-DC7CBFC75277}"/>
+              </a:ext>
+            </a:extLst>
+          </p:cNvPr>
+          <p:cNvSpPr txBox="1">
+            <a:spLocks/>
+          </p:cNvSpPr>
+          <p:nvPr/>
+        </p:nvSpPr>
+        <p:spPr>
+          <a:xfrm>
             <a:off x="1655454" y="378372"/>
             <a:ext cx="8881091" cy="1069717"/>
           </a:xfrm>
@@ -4883,7 +6741,7 @@
 </p:sld>
 </file>
 
-<file path=ppt/slides/slide11.xml><?xml version="1.0" encoding="utf-8"?>
+<file path=ppt/slides/slide15.xml><?xml version="1.0" encoding="utf-8"?>
 <p:sld xmlns:a="http://schemas.openxmlformats.org/drawingml/2006/main" xmlns:r="http://schemas.openxmlformats.org/officeDocument/2006/relationships" xmlns:p="http://schemas.openxmlformats.org/presentationml/2006/main">
   <p:cSld>
     <p:spTree>
@@ -5077,7 +6935,7 @@
 </p:sld>
 </file>
 
-<file path=ppt/slides/slide12.xml><?xml version="1.0" encoding="utf-8"?>
+<file path=ppt/slides/slide16.xml><?xml version="1.0" encoding="utf-8"?>
 <p:sld xmlns:a="http://schemas.openxmlformats.org/drawingml/2006/main" xmlns:r="http://schemas.openxmlformats.org/officeDocument/2006/relationships" xmlns:p="http://schemas.openxmlformats.org/presentationml/2006/main">
   <p:cSld>
     <p:spTree>
@@ -5394,7 +7252,7 @@
 </p:sld>
 </file>
 
-<file path=ppt/slides/slide13.xml><?xml version="1.0" encoding="utf-8"?>
+<file path=ppt/slides/slide17.xml><?xml version="1.0" encoding="utf-8"?>
 <p:sld xmlns:a="http://schemas.openxmlformats.org/drawingml/2006/main" xmlns:r="http://schemas.openxmlformats.org/officeDocument/2006/relationships" xmlns:p="http://schemas.openxmlformats.org/presentationml/2006/main">
   <p:cSld>
     <p:spTree>
@@ -5799,7 +7657,7 @@
 </p:sld>
 </file>
 
-<file path=ppt/slides/slide14.xml><?xml version="1.0" encoding="utf-8"?>
+<file path=ppt/slides/slide18.xml><?xml version="1.0" encoding="utf-8"?>
 <p:sld xmlns:a="http://schemas.openxmlformats.org/drawingml/2006/main" xmlns:r="http://schemas.openxmlformats.org/officeDocument/2006/relationships" xmlns:p="http://schemas.openxmlformats.org/presentationml/2006/main">
   <p:cSld>
     <p:spTree>
@@ -9581,7 +11439,7 @@
         </p:nvSpPr>
         <p:spPr>
           <a:xfrm>
-            <a:off x="3981422" y="1918398"/>
+            <a:off x="4227365" y="1899480"/>
             <a:ext cx="4229154" cy="3539430"/>
           </a:xfrm>
           <a:prstGeom prst="rect">
@@ -9666,7 +11524,7 @@
     </p:spTree>
     <p:extLst>
       <p:ext uri="{BB962C8B-B14F-4D97-AF65-F5344CB8AC3E}">
-        <p14:creationId xmlns:p14="http://schemas.microsoft.com/office/powerpoint/2010/main" val="798688568"/>
+        <p14:creationId xmlns:p14="http://schemas.microsoft.com/office/powerpoint/2010/main" val="3271839151"/>
       </p:ext>
     </p:extLst>
   </p:cSld>

</xml_diff>